<commit_message>
Shaindy fixed something here...
</commit_message>
<xml_diff>
--- a/Payroll Application.pptx
+++ b/Payroll Application.pptx
@@ -122,6 +122,14 @@
     </p:ext>
   </p:extLst>
 </p:presentation>
+</file>
+
+<file path=ppt/revisionInfo.xml><?xml version="1.0" encoding="utf-8"?>
+<p1510:revInfo xmlns:a="http://schemas.openxmlformats.org/drawingml/2006/main" xmlns:r="http://schemas.openxmlformats.org/officeDocument/2006/relationships" xmlns:p1510="http://schemas.microsoft.com/office/powerpoint/2015/10/main">
+  <p1510:revLst>
+    <p1510:client id="{B10C8A10-7C14-4BE4-9BB0-C5011DEA2264}" v="1" dt="2022-01-06T21:45:02.334"/>
+  </p1510:revLst>
+</p1510:revInfo>
 </file>
 
 <file path=ppt/diagrams/colors1.xml><?xml version="1.0" encoding="utf-8"?>
@@ -21851,7 +21859,7 @@
           <a:p>
             <a:fld id="{72345051-2045-45DA-935E-2E3CA1A69ADC}" type="datetimeFigureOut">
               <a:rPr lang="en-US" smtClean="0"/>
-              <a:t>1/5/2022</a:t>
+              <a:t>1/6/2022</a:t>
             </a:fld>
             <a:endParaRPr lang="en-US" dirty="0"/>
           </a:p>
@@ -21921,13 +21929,13 @@
   <p:clrMapOvr>
     <a:masterClrMapping/>
   </p:clrMapOvr>
-  <mc:AlternateContent xmlns:mc="http://schemas.openxmlformats.org/markup-compatibility/2006">
-    <mc:Choice xmlns:p14="http://schemas.microsoft.com/office/powerpoint/2010/main" Requires="p14">
+  <mc:AlternateContent xmlns:mc="http://schemas.openxmlformats.org/markup-compatibility/2006" xmlns:p14="http://schemas.microsoft.com/office/powerpoint/2010/main">
+    <mc:Choice Requires="p14">
       <p:transition spd="med" p14:dur="700">
         <p:fade/>
       </p:transition>
     </mc:Choice>
-    <mc:Fallback>
+    <mc:Fallback xmlns="">
       <p:transition spd="med">
         <p:fade/>
       </p:transition>
@@ -22061,7 +22069,7 @@
           <a:p>
             <a:fld id="{72345051-2045-45DA-935E-2E3CA1A69ADC}" type="datetimeFigureOut">
               <a:rPr lang="en-US" smtClean="0"/>
-              <a:t>1/5/2022</a:t>
+              <a:t>1/6/2022</a:t>
             </a:fld>
             <a:endParaRPr lang="en-US"/>
           </a:p>
@@ -22131,13 +22139,13 @@
   <p:clrMapOvr>
     <a:masterClrMapping/>
   </p:clrMapOvr>
-  <mc:AlternateContent xmlns:mc="http://schemas.openxmlformats.org/markup-compatibility/2006">
-    <mc:Choice xmlns:p14="http://schemas.microsoft.com/office/powerpoint/2010/main" Requires="p14">
+  <mc:AlternateContent xmlns:mc="http://schemas.openxmlformats.org/markup-compatibility/2006" xmlns:p14="http://schemas.microsoft.com/office/powerpoint/2010/main">
+    <mc:Choice Requires="p14">
       <p:transition spd="med" p14:dur="700">
         <p:fade/>
       </p:transition>
     </mc:Choice>
-    <mc:Fallback>
+    <mc:Fallback xmlns="">
       <p:transition spd="med">
         <p:fade/>
       </p:transition>
@@ -22281,7 +22289,7 @@
           <a:p>
             <a:fld id="{72345051-2045-45DA-935E-2E3CA1A69ADC}" type="datetimeFigureOut">
               <a:rPr lang="en-US" smtClean="0"/>
-              <a:t>1/5/2022</a:t>
+              <a:t>1/6/2022</a:t>
             </a:fld>
             <a:endParaRPr lang="en-US"/>
           </a:p>
@@ -22351,13 +22359,13 @@
   <p:clrMapOvr>
     <a:masterClrMapping/>
   </p:clrMapOvr>
-  <mc:AlternateContent xmlns:mc="http://schemas.openxmlformats.org/markup-compatibility/2006">
-    <mc:Choice xmlns:p14="http://schemas.microsoft.com/office/powerpoint/2010/main" Requires="p14">
+  <mc:AlternateContent xmlns:mc="http://schemas.openxmlformats.org/markup-compatibility/2006" xmlns:p14="http://schemas.microsoft.com/office/powerpoint/2010/main">
+    <mc:Choice Requires="p14">
       <p:transition spd="med" p14:dur="700">
         <p:fade/>
       </p:transition>
     </mc:Choice>
-    <mc:Fallback>
+    <mc:Fallback xmlns="">
       <p:transition spd="med">
         <p:fade/>
       </p:transition>
@@ -22515,7 +22523,7 @@
           <a:p>
             <a:fld id="{72345051-2045-45DA-935E-2E3CA1A69ADC}" type="datetimeFigureOut">
               <a:rPr lang="en-US" smtClean="0"/>
-              <a:t>1/5/2022</a:t>
+              <a:t>1/6/2022</a:t>
             </a:fld>
             <a:endParaRPr lang="en-US"/>
           </a:p>
@@ -23216,13 +23224,13 @@
   <p:clrMapOvr>
     <a:masterClrMapping/>
   </p:clrMapOvr>
-  <mc:AlternateContent xmlns:mc="http://schemas.openxmlformats.org/markup-compatibility/2006">
-    <mc:Choice xmlns:p14="http://schemas.microsoft.com/office/powerpoint/2010/main" Requires="p14">
+  <mc:AlternateContent xmlns:mc="http://schemas.openxmlformats.org/markup-compatibility/2006" xmlns:p14="http://schemas.microsoft.com/office/powerpoint/2010/main">
+    <mc:Choice Requires="p14">
       <p:transition spd="med" p14:dur="700">
         <p:fade/>
       </p:transition>
     </mc:Choice>
-    <mc:Fallback>
+    <mc:Fallback xmlns="">
       <p:transition spd="med">
         <p:fade/>
       </p:transition>
@@ -23438,7 +23446,7 @@
           <a:p>
             <a:fld id="{72345051-2045-45DA-935E-2E3CA1A69ADC}" type="datetimeFigureOut">
               <a:rPr lang="en-US" smtClean="0"/>
-              <a:t>1/5/2022</a:t>
+              <a:t>1/6/2022</a:t>
             </a:fld>
             <a:endParaRPr lang="en-US"/>
           </a:p>
@@ -23844,13 +23852,13 @@
   <p:clrMapOvr>
     <a:masterClrMapping/>
   </p:clrMapOvr>
-  <mc:AlternateContent xmlns:mc="http://schemas.openxmlformats.org/markup-compatibility/2006">
-    <mc:Choice xmlns:p14="http://schemas.microsoft.com/office/powerpoint/2010/main" Requires="p14">
+  <mc:AlternateContent xmlns:mc="http://schemas.openxmlformats.org/markup-compatibility/2006" xmlns:p14="http://schemas.microsoft.com/office/powerpoint/2010/main">
+    <mc:Choice Requires="p14">
       <p:transition spd="med" p14:dur="700">
         <p:fade/>
       </p:transition>
     </mc:Choice>
-    <mc:Fallback>
+    <mc:Fallback xmlns="">
       <p:transition spd="med">
         <p:fade/>
       </p:transition>
@@ -24053,7 +24061,7 @@
           <a:p>
             <a:fld id="{72345051-2045-45DA-935E-2E3CA1A69ADC}" type="datetimeFigureOut">
               <a:rPr lang="en-US" smtClean="0"/>
-              <a:t>1/5/2022</a:t>
+              <a:t>1/6/2022</a:t>
             </a:fld>
             <a:endParaRPr lang="en-US"/>
           </a:p>
@@ -24754,13 +24762,13 @@
   <p:clrMapOvr>
     <a:masterClrMapping/>
   </p:clrMapOvr>
-  <mc:AlternateContent xmlns:mc="http://schemas.openxmlformats.org/markup-compatibility/2006">
-    <mc:Choice xmlns:p14="http://schemas.microsoft.com/office/powerpoint/2010/main" Requires="p14">
+  <mc:AlternateContent xmlns:mc="http://schemas.openxmlformats.org/markup-compatibility/2006" xmlns:p14="http://schemas.microsoft.com/office/powerpoint/2010/main">
+    <mc:Choice Requires="p14">
       <p:transition spd="med" p14:dur="700">
         <p:fade/>
       </p:transition>
     </mc:Choice>
-    <mc:Fallback>
+    <mc:Fallback xmlns="">
       <p:transition spd="med">
         <p:fade/>
       </p:transition>
@@ -25113,7 +25121,7 @@
           <a:p>
             <a:fld id="{72345051-2045-45DA-935E-2E3CA1A69ADC}" type="datetimeFigureOut">
               <a:rPr lang="en-US" smtClean="0"/>
-              <a:t>1/5/2022</a:t>
+              <a:t>1/6/2022</a:t>
             </a:fld>
             <a:endParaRPr lang="en-US"/>
           </a:p>
@@ -25814,13 +25822,13 @@
   <p:clrMapOvr>
     <a:masterClrMapping/>
   </p:clrMapOvr>
-  <mc:AlternateContent xmlns:mc="http://schemas.openxmlformats.org/markup-compatibility/2006">
-    <mc:Choice xmlns:p14="http://schemas.microsoft.com/office/powerpoint/2010/main" Requires="p14">
+  <mc:AlternateContent xmlns:mc="http://schemas.openxmlformats.org/markup-compatibility/2006" xmlns:p14="http://schemas.microsoft.com/office/powerpoint/2010/main">
+    <mc:Choice Requires="p14">
       <p:transition spd="med" p14:dur="700">
         <p:fade/>
       </p:transition>
     </mc:Choice>
-    <mc:Fallback>
+    <mc:Fallback xmlns="">
       <p:transition spd="med">
         <p:fade/>
       </p:transition>
@@ -25909,7 +25917,7 @@
           <a:p>
             <a:fld id="{72345051-2045-45DA-935E-2E3CA1A69ADC}" type="datetimeFigureOut">
               <a:rPr lang="en-US" smtClean="0"/>
-              <a:t>1/5/2022</a:t>
+              <a:t>1/6/2022</a:t>
             </a:fld>
             <a:endParaRPr lang="en-US"/>
           </a:p>
@@ -26315,13 +26323,13 @@
   <p:clrMapOvr>
     <a:masterClrMapping/>
   </p:clrMapOvr>
-  <mc:AlternateContent xmlns:mc="http://schemas.openxmlformats.org/markup-compatibility/2006">
-    <mc:Choice xmlns:p14="http://schemas.microsoft.com/office/powerpoint/2010/main" Requires="p14">
+  <mc:AlternateContent xmlns:mc="http://schemas.openxmlformats.org/markup-compatibility/2006" xmlns:p14="http://schemas.microsoft.com/office/powerpoint/2010/main">
+    <mc:Choice Requires="p14">
       <p:transition spd="med" p14:dur="700">
         <p:fade/>
       </p:transition>
     </mc:Choice>
-    <mc:Fallback>
+    <mc:Fallback xmlns="">
       <p:transition spd="med">
         <p:fade/>
       </p:transition>
@@ -26370,7 +26378,7 @@
           <a:p>
             <a:fld id="{72345051-2045-45DA-935E-2E3CA1A69ADC}" type="datetimeFigureOut">
               <a:rPr lang="en-US" smtClean="0"/>
-              <a:t>1/5/2022</a:t>
+              <a:t>1/6/2022</a:t>
             </a:fld>
             <a:endParaRPr lang="en-US"/>
           </a:p>
@@ -26440,13 +26448,13 @@
   <p:clrMapOvr>
     <a:masterClrMapping/>
   </p:clrMapOvr>
-  <mc:AlternateContent xmlns:mc="http://schemas.openxmlformats.org/markup-compatibility/2006">
-    <mc:Choice xmlns:p14="http://schemas.microsoft.com/office/powerpoint/2010/main" Requires="p14">
+  <mc:AlternateContent xmlns:mc="http://schemas.openxmlformats.org/markup-compatibility/2006" xmlns:p14="http://schemas.microsoft.com/office/powerpoint/2010/main">
+    <mc:Choice Requires="p14">
       <p:transition spd="med" p14:dur="700">
         <p:fade/>
       </p:transition>
     </mc:Choice>
-    <mc:Fallback>
+    <mc:Fallback xmlns="">
       <p:transition spd="med">
         <p:fade/>
       </p:transition>
@@ -26699,7 +26707,7 @@
           <a:p>
             <a:fld id="{72345051-2045-45DA-935E-2E3CA1A69ADC}" type="datetimeFigureOut">
               <a:rPr lang="en-US" smtClean="0"/>
-              <a:t>1/5/2022</a:t>
+              <a:t>1/6/2022</a:t>
             </a:fld>
             <a:endParaRPr lang="en-US"/>
           </a:p>
@@ -27101,13 +27109,13 @@
   <p:clrMapOvr>
     <a:masterClrMapping/>
   </p:clrMapOvr>
-  <mc:AlternateContent xmlns:mc="http://schemas.openxmlformats.org/markup-compatibility/2006">
-    <mc:Choice xmlns:p14="http://schemas.microsoft.com/office/powerpoint/2010/main" Requires="p14">
+  <mc:AlternateContent xmlns:mc="http://schemas.openxmlformats.org/markup-compatibility/2006" xmlns:p14="http://schemas.microsoft.com/office/powerpoint/2010/main">
+    <mc:Choice Requires="p14">
       <p:transition spd="med" p14:dur="700">
         <p:fade/>
       </p:transition>
     </mc:Choice>
-    <mc:Fallback>
+    <mc:Fallback xmlns="">
       <p:transition spd="med">
         <p:fade/>
       </p:transition>
@@ -27339,7 +27347,7 @@
           <a:p>
             <a:fld id="{72345051-2045-45DA-935E-2E3CA1A69ADC}" type="datetimeFigureOut">
               <a:rPr lang="en-US" smtClean="0"/>
-              <a:t>1/5/2022</a:t>
+              <a:t>1/6/2022</a:t>
             </a:fld>
             <a:endParaRPr lang="en-US"/>
           </a:p>
@@ -27741,13 +27749,13 @@
   <p:clrMapOvr>
     <a:masterClrMapping/>
   </p:clrMapOvr>
-  <mc:AlternateContent xmlns:mc="http://schemas.openxmlformats.org/markup-compatibility/2006">
-    <mc:Choice xmlns:p14="http://schemas.microsoft.com/office/powerpoint/2010/main" Requires="p14">
+  <mc:AlternateContent xmlns:mc="http://schemas.openxmlformats.org/markup-compatibility/2006" xmlns:p14="http://schemas.microsoft.com/office/powerpoint/2010/main">
+    <mc:Choice Requires="p14">
       <p:transition spd="med" p14:dur="700">
         <p:fade/>
       </p:transition>
     </mc:Choice>
-    <mc:Fallback>
+    <mc:Fallback xmlns="">
       <p:transition spd="med">
         <p:fade/>
       </p:transition>
@@ -27924,7 +27932,7 @@
           <a:p>
             <a:fld id="{72345051-2045-45DA-935E-2E3CA1A69ADC}" type="datetimeFigureOut">
               <a:rPr lang="en-US" smtClean="0"/>
-              <a:t>1/5/2022</a:t>
+              <a:t>1/6/2022</a:t>
             </a:fld>
             <a:endParaRPr lang="en-US" dirty="0"/>
           </a:p>
@@ -28041,13 +28049,13 @@
     <p:sldLayoutId id="2147483752" r:id="rId10"/>
     <p:sldLayoutId id="2147483754" r:id="rId11"/>
   </p:sldLayoutIdLst>
-  <mc:AlternateContent xmlns:mc="http://schemas.openxmlformats.org/markup-compatibility/2006">
-    <mc:Choice xmlns:p14="http://schemas.microsoft.com/office/powerpoint/2010/main" Requires="p14">
+  <mc:AlternateContent xmlns:mc="http://schemas.openxmlformats.org/markup-compatibility/2006" xmlns:p14="http://schemas.microsoft.com/office/powerpoint/2010/main">
+    <mc:Choice Requires="p14">
       <p:transition spd="med" p14:dur="700">
         <p:fade/>
       </p:transition>
     </mc:Choice>
-    <mc:Fallback>
+    <mc:Fallback xmlns="">
       <p:transition spd="med">
         <p:fade/>
       </p:transition>
@@ -29439,13 +29447,13 @@
   <p:clrMapOvr>
     <a:overrideClrMapping bg1="dk1" tx1="lt1" bg2="dk2" tx2="lt2" accent1="accent1" accent2="accent2" accent3="accent3" accent4="accent4" accent5="accent5" accent6="accent6" hlink="hlink" folHlink="folHlink"/>
   </p:clrMapOvr>
-  <mc:AlternateContent xmlns:mc="http://schemas.openxmlformats.org/markup-compatibility/2006">
-    <mc:Choice xmlns:p14="http://schemas.microsoft.com/office/powerpoint/2010/main" Requires="p14">
+  <mc:AlternateContent xmlns:mc="http://schemas.openxmlformats.org/markup-compatibility/2006" xmlns:p14="http://schemas.microsoft.com/office/powerpoint/2010/main">
+    <mc:Choice Requires="p14">
       <p:transition spd="med" p14:dur="700">
         <p:fade/>
       </p:transition>
     </mc:Choice>
-    <mc:Fallback>
+    <mc:Fallback xmlns="">
       <p:transition spd="med">
         <p:fade/>
       </p:transition>
@@ -30288,7 +30296,7 @@
       </p:sp>
       <p:pic>
         <p:nvPicPr>
-          <p:cNvPr id="5" name="Content Placeholder 4" descr="Text&#10;&#10;Description automatically generated">
+          <p:cNvPr id="5" name="Content Placeholder 4">
             <a:extLst>
               <a:ext uri="{FF2B5EF4-FFF2-40B4-BE49-F238E27FC236}">
                 <a16:creationId xmlns:a16="http://schemas.microsoft.com/office/drawing/2014/main" id="{F4239137-4C6D-4904-B7AE-A175E111F814}"/>
@@ -30310,14 +30318,13 @@
               </a:ext>
             </a:extLst>
           </a:blip>
-          <a:stretch>
-            <a:fillRect/>
-          </a:stretch>
+          <a:srcRect/>
+          <a:stretch/>
         </p:blipFill>
         <p:spPr>
           <a:xfrm>
-            <a:off x="5025214" y="640080"/>
-            <a:ext cx="6472779" cy="5550408"/>
+            <a:off x="5376726" y="640080"/>
+            <a:ext cx="5769755" cy="5550408"/>
           </a:xfrm>
           <a:prstGeom prst="rect">
             <a:avLst/>
@@ -30339,13 +30346,13 @@
   <p:clrMapOvr>
     <a:masterClrMapping/>
   </p:clrMapOvr>
-  <mc:AlternateContent xmlns:mc="http://schemas.openxmlformats.org/markup-compatibility/2006">
-    <mc:Choice xmlns:p14="http://schemas.microsoft.com/office/powerpoint/2010/main" Requires="p14">
+  <mc:AlternateContent xmlns:mc="http://schemas.openxmlformats.org/markup-compatibility/2006" xmlns:p14="http://schemas.microsoft.com/office/powerpoint/2010/main">
+    <mc:Choice Requires="p14">
       <p:transition spd="med" p14:dur="700">
         <p:fade/>
       </p:transition>
     </mc:Choice>
-    <mc:Fallback>
+    <mc:Fallback xmlns="">
       <p:transition spd="med">
         <p:fade/>
       </p:transition>
@@ -30929,8 +30936,8 @@
           </a:p>
         </p:txBody>
       </p:sp>
-      <mc:AlternateContent xmlns:mc="http://schemas.openxmlformats.org/markup-compatibility/2006">
-        <mc:Choice xmlns:p14="http://schemas.microsoft.com/office/powerpoint/2010/main" Requires="p14">
+      <mc:AlternateContent xmlns:mc="http://schemas.openxmlformats.org/markup-compatibility/2006" xmlns:p14="http://schemas.microsoft.com/office/powerpoint/2010/main">
+        <mc:Choice Requires="p14">
           <p:contentPart p14:bwMode="auto" r:id="rId2">
             <p14:nvContentPartPr>
               <p14:cNvPr id="14" name="Ink 13">
@@ -30960,7 +30967,7 @@
             </p14:xfrm>
           </p:contentPart>
         </mc:Choice>
-        <mc:Fallback>
+        <mc:Fallback xmlns="">
           <p:pic>
             <p:nvPicPr>
               <p:cNvPr id="14" name="Ink 13">
@@ -31045,13 +31052,13 @@
   <p:clrMapOvr>
     <a:masterClrMapping/>
   </p:clrMapOvr>
-  <mc:AlternateContent xmlns:mc="http://schemas.openxmlformats.org/markup-compatibility/2006">
-    <mc:Choice xmlns:p14="http://schemas.microsoft.com/office/powerpoint/2010/main" Requires="p14">
+  <mc:AlternateContent xmlns:mc="http://schemas.openxmlformats.org/markup-compatibility/2006" xmlns:p14="http://schemas.microsoft.com/office/powerpoint/2010/main">
+    <mc:Choice Requires="p14">
       <p:transition spd="med" p14:dur="700">
         <p:fade/>
       </p:transition>
     </mc:Choice>
-    <mc:Fallback>
+    <mc:Fallback xmlns="">
       <p:transition spd="med">
         <p:fade/>
       </p:transition>
@@ -31564,13 +31571,13 @@
   <p:clrMapOvr>
     <a:masterClrMapping/>
   </p:clrMapOvr>
-  <mc:AlternateContent xmlns:mc="http://schemas.openxmlformats.org/markup-compatibility/2006">
-    <mc:Choice xmlns:p14="http://schemas.microsoft.com/office/powerpoint/2010/main" Requires="p14">
+  <mc:AlternateContent xmlns:mc="http://schemas.openxmlformats.org/markup-compatibility/2006" xmlns:p14="http://schemas.microsoft.com/office/powerpoint/2010/main">
+    <mc:Choice Requires="p14">
       <p:transition spd="med" p14:dur="700">
         <p:fade/>
       </p:transition>
     </mc:Choice>
-    <mc:Fallback>
+    <mc:Fallback xmlns="">
       <p:transition spd="med">
         <p:fade/>
       </p:transition>
@@ -32694,13 +32701,13 @@
   <p:clrMapOvr>
     <a:masterClrMapping/>
   </p:clrMapOvr>
-  <mc:AlternateContent xmlns:mc="http://schemas.openxmlformats.org/markup-compatibility/2006">
-    <mc:Choice xmlns:p14="http://schemas.microsoft.com/office/powerpoint/2010/main" Requires="p14">
+  <mc:AlternateContent xmlns:mc="http://schemas.openxmlformats.org/markup-compatibility/2006" xmlns:p14="http://schemas.microsoft.com/office/powerpoint/2010/main">
+    <mc:Choice Requires="p14">
       <p:transition spd="med" p14:dur="700">
         <p:fade/>
       </p:transition>
     </mc:Choice>
-    <mc:Fallback>
+    <mc:Fallback xmlns="">
       <p:transition spd="med">
         <p:fade/>
       </p:transition>
@@ -32926,13 +32933,13 @@
   <p:clrMapOvr>
     <a:masterClrMapping/>
   </p:clrMapOvr>
-  <mc:AlternateContent xmlns:mc="http://schemas.openxmlformats.org/markup-compatibility/2006">
-    <mc:Choice xmlns:p14="http://schemas.microsoft.com/office/powerpoint/2010/main" Requires="p14">
+  <mc:AlternateContent xmlns:mc="http://schemas.openxmlformats.org/markup-compatibility/2006" xmlns:p14="http://schemas.microsoft.com/office/powerpoint/2010/main">
+    <mc:Choice Requires="p14">
       <p:transition spd="med" p14:dur="700">
         <p:fade/>
       </p:transition>
     </mc:Choice>
-    <mc:Fallback>
+    <mc:Fallback xmlns="">
       <p:transition spd="med">
         <p:fade/>
       </p:transition>
@@ -33745,13 +33752,13 @@
   <p:clrMapOvr>
     <a:masterClrMapping/>
   </p:clrMapOvr>
-  <mc:AlternateContent xmlns:mc="http://schemas.openxmlformats.org/markup-compatibility/2006">
-    <mc:Choice xmlns:p14="http://schemas.microsoft.com/office/powerpoint/2010/main" Requires="p14">
+  <mc:AlternateContent xmlns:mc="http://schemas.openxmlformats.org/markup-compatibility/2006" xmlns:p14="http://schemas.microsoft.com/office/powerpoint/2010/main">
+    <mc:Choice Requires="p14">
       <p:transition spd="med" p14:dur="700">
         <p:fade/>
       </p:transition>
     </mc:Choice>
-    <mc:Fallback>
+    <mc:Fallback xmlns="">
       <p:transition spd="med">
         <p:fade/>
       </p:transition>
@@ -34559,13 +34566,13 @@
   <p:clrMapOvr>
     <a:masterClrMapping/>
   </p:clrMapOvr>
-  <mc:AlternateContent xmlns:mc="http://schemas.openxmlformats.org/markup-compatibility/2006">
-    <mc:Choice xmlns:p14="http://schemas.microsoft.com/office/powerpoint/2010/main" Requires="p14">
+  <mc:AlternateContent xmlns:mc="http://schemas.openxmlformats.org/markup-compatibility/2006" xmlns:p14="http://schemas.microsoft.com/office/powerpoint/2010/main">
+    <mc:Choice Requires="p14">
       <p:transition spd="med" p14:dur="700">
         <p:fade/>
       </p:transition>
     </mc:Choice>
-    <mc:Fallback>
+    <mc:Fallback xmlns="">
       <p:transition spd="med">
         <p:fade/>
       </p:transition>
@@ -35436,13 +35443,13 @@
   <p:clrMapOvr>
     <a:masterClrMapping/>
   </p:clrMapOvr>
-  <mc:AlternateContent xmlns:mc="http://schemas.openxmlformats.org/markup-compatibility/2006">
-    <mc:Choice xmlns:p14="http://schemas.microsoft.com/office/powerpoint/2010/main" Requires="p14">
+  <mc:AlternateContent xmlns:mc="http://schemas.openxmlformats.org/markup-compatibility/2006" xmlns:p14="http://schemas.microsoft.com/office/powerpoint/2010/main">
+    <mc:Choice Requires="p14">
       <p:transition spd="med" p14:dur="700">
         <p:fade/>
       </p:transition>
     </mc:Choice>
-    <mc:Fallback>
+    <mc:Fallback xmlns="">
       <p:transition spd="med">
         <p:fade/>
       </p:transition>
@@ -36251,13 +36258,13 @@
   <p:clrMapOvr>
     <a:masterClrMapping/>
   </p:clrMapOvr>
-  <mc:AlternateContent xmlns:mc="http://schemas.openxmlformats.org/markup-compatibility/2006">
-    <mc:Choice xmlns:p14="http://schemas.microsoft.com/office/powerpoint/2010/main" Requires="p14">
+  <mc:AlternateContent xmlns:mc="http://schemas.openxmlformats.org/markup-compatibility/2006" xmlns:p14="http://schemas.microsoft.com/office/powerpoint/2010/main">
+    <mc:Choice Requires="p14">
       <p:transition spd="med" p14:dur="700">
         <p:fade/>
       </p:transition>
     </mc:Choice>
-    <mc:Fallback>
+    <mc:Fallback xmlns="">
       <p:transition spd="med">
         <p:fade/>
       </p:transition>
@@ -36847,13 +36854,13 @@
   <p:clrMapOvr>
     <a:masterClrMapping/>
   </p:clrMapOvr>
-  <mc:AlternateContent xmlns:mc="http://schemas.openxmlformats.org/markup-compatibility/2006">
-    <mc:Choice xmlns:p14="http://schemas.microsoft.com/office/powerpoint/2010/main" Requires="p14">
+  <mc:AlternateContent xmlns:mc="http://schemas.openxmlformats.org/markup-compatibility/2006" xmlns:p14="http://schemas.microsoft.com/office/powerpoint/2010/main">
+    <mc:Choice Requires="p14">
       <p:transition spd="med" p14:dur="700">
         <p:fade/>
       </p:transition>
     </mc:Choice>
-    <mc:Fallback>
+    <mc:Fallback xmlns="">
       <p:transition spd="med">
         <p:fade/>
       </p:transition>
@@ -37471,13 +37478,13 @@
   <p:clrMapOvr>
     <a:masterClrMapping/>
   </p:clrMapOvr>
-  <mc:AlternateContent xmlns:mc="http://schemas.openxmlformats.org/markup-compatibility/2006">
-    <mc:Choice xmlns:p14="http://schemas.microsoft.com/office/powerpoint/2010/main" Requires="p14">
+  <mc:AlternateContent xmlns:mc="http://schemas.openxmlformats.org/markup-compatibility/2006" xmlns:p14="http://schemas.microsoft.com/office/powerpoint/2010/main">
+    <mc:Choice Requires="p14">
       <p:transition spd="med" p14:dur="700">
         <p:fade/>
       </p:transition>
     </mc:Choice>
-    <mc:Fallback>
+    <mc:Fallback xmlns="">
       <p:transition spd="med">
         <p:fade/>
       </p:transition>
@@ -37960,13 +37967,13 @@
   <p:clrMapOvr>
     <a:masterClrMapping/>
   </p:clrMapOvr>
-  <mc:AlternateContent xmlns:mc="http://schemas.openxmlformats.org/markup-compatibility/2006">
-    <mc:Choice xmlns:p14="http://schemas.microsoft.com/office/powerpoint/2010/main" Requires="p14">
+  <mc:AlternateContent xmlns:mc="http://schemas.openxmlformats.org/markup-compatibility/2006" xmlns:p14="http://schemas.microsoft.com/office/powerpoint/2010/main">
+    <mc:Choice Requires="p14">
       <p:transition spd="med" p14:dur="700">
         <p:fade/>
       </p:transition>
     </mc:Choice>
-    <mc:Fallback>
+    <mc:Fallback xmlns="">
       <p:transition spd="med">
         <p:fade/>
       </p:transition>

</xml_diff>